<commit_message>
Working on poster and report
</commit_message>
<xml_diff>
--- a/Documentation/Poster/Chirag Mini Project.pptx
+++ b/Documentation/Poster/Chirag Mini Project.pptx
@@ -288,7 +288,7 @@
             <a:fld id="{B23AD2AD-1315-46E7-B1B1-7215DC0D8137}" type="datetimeFigureOut">
               <a:rPr lang="en-US" smtClean="0"/>
               <a:pPr/>
-              <a:t>4/19/2018</a:t>
+              <a:t>4/20/2018</a:t>
             </a:fld>
             <a:endParaRPr lang="en-US"/>
           </a:p>
@@ -9047,7 +9047,7 @@
         </p:nvSpPr>
         <p:spPr bwMode="auto">
           <a:xfrm>
-            <a:off x="7250653" y="275082"/>
+            <a:off x="7273513" y="275082"/>
             <a:ext cx="23115590" cy="4158726"/>
           </a:xfrm>
           <a:prstGeom prst="rect">
@@ -9186,7 +9186,7 @@
         </p:nvSpPr>
         <p:spPr bwMode="auto">
           <a:xfrm>
-            <a:off x="768350" y="5254625"/>
+            <a:off x="791210" y="5254625"/>
             <a:ext cx="11083925" cy="533400"/>
           </a:xfrm>
           <a:prstGeom prst="rect">
@@ -9330,8 +9330,8 @@
         </p:nvSpPr>
         <p:spPr bwMode="auto">
           <a:xfrm>
-            <a:off x="889793" y="5800059"/>
-            <a:ext cx="10841037" cy="4758409"/>
+            <a:off x="912653" y="5800059"/>
+            <a:ext cx="10841037" cy="6758957"/>
           </a:xfrm>
           <a:prstGeom prst="rect">
             <a:avLst/>
@@ -9509,8 +9509,41 @@
               <a:rPr lang="en-US" sz="2600" dirty="0">
                 <a:latin typeface="+mj-lt"/>
               </a:rPr>
-              <a:t>Meeting rooms are always in demand</a:t>
-            </a:r>
+              <a:t>Meeting rooms are always in </a:t>
+            </a:r>
+            <a:r>
+              <a:rPr lang="en-US" sz="2600" dirty="0" smtClean="0">
+                <a:latin typeface="+mj-lt"/>
+              </a:rPr>
+              <a:t>demand</a:t>
+            </a:r>
+          </a:p>
+          <a:p>
+            <a:pPr algn="just">
+              <a:buFont typeface="Wingdings" pitchFamily="2" charset="2"/>
+              <a:buChar char="Ø"/>
+            </a:pPr>
+            <a:r>
+              <a:rPr lang="en-US" sz="2600" dirty="0" smtClean="0">
+                <a:latin typeface="+mj-lt"/>
+              </a:rPr>
+              <a:t>If </a:t>
+            </a:r>
+            <a:r>
+              <a:rPr lang="en-US" sz="2600" dirty="0">
+                <a:latin typeface="+mj-lt"/>
+              </a:rPr>
+              <a:t>someone wants to have a meeting spontaneously without booking the room then the he/she has to go from room to room to check the occupancy status of the same</a:t>
+            </a:r>
+          </a:p>
+          <a:p>
+            <a:pPr marL="457200" indent="-457200" algn="just">
+              <a:buFont typeface="Wingdings" pitchFamily="2" charset="2"/>
+              <a:buChar char="Ø"/>
+            </a:pPr>
+            <a:endParaRPr lang="en-US" sz="2600" dirty="0">
+              <a:latin typeface="+mj-lt"/>
+            </a:endParaRPr>
           </a:p>
           <a:p>
             <a:pPr algn="just">
@@ -9533,7 +9566,7 @@
         </p:nvSpPr>
         <p:spPr bwMode="auto">
           <a:xfrm>
-            <a:off x="768350" y="16048629"/>
+            <a:off x="791210" y="15019929"/>
             <a:ext cx="11083925" cy="533400"/>
           </a:xfrm>
           <a:prstGeom prst="rect">
@@ -9669,150 +9702,6 @@
       </p:sp>
       <p:sp>
         <p:nvSpPr>
-          <p:cNvPr id="2543" name="Text Box 495"/>
-          <p:cNvSpPr txBox="1">
-            <a:spLocks noChangeArrowheads="1"/>
-          </p:cNvSpPr>
-          <p:nvPr/>
-        </p:nvSpPr>
-        <p:spPr bwMode="auto">
-          <a:xfrm>
-            <a:off x="12398602" y="5278685"/>
-            <a:ext cx="11082338" cy="533400"/>
-          </a:xfrm>
-          <a:prstGeom prst="rect">
-            <a:avLst/>
-          </a:prstGeom>
-          <a:solidFill>
-            <a:srgbClr val="002060"/>
-          </a:solidFill>
-          <a:ln>
-            <a:noFill/>
-          </a:ln>
-          <a:effectLst/>
-        </p:spPr>
-        <p:txBody>
-          <a:bodyPr lIns="74857" tIns="37421" rIns="74857" bIns="37421">
-            <a:spAutoFit/>
-          </a:bodyPr>
-          <a:lstStyle>
-            <a:lvl1pPr defTabSz="749300">
-              <a:defRPr>
-                <a:solidFill>
-                  <a:schemeClr val="tx1"/>
-                </a:solidFill>
-                <a:latin typeface="Arial" charset="0"/>
-              </a:defRPr>
-            </a:lvl1pPr>
-            <a:lvl2pPr marL="374650" defTabSz="749300">
-              <a:defRPr>
-                <a:solidFill>
-                  <a:schemeClr val="tx1"/>
-                </a:solidFill>
-                <a:latin typeface="Arial" charset="0"/>
-              </a:defRPr>
-            </a:lvl2pPr>
-            <a:lvl3pPr marL="749300" defTabSz="749300">
-              <a:defRPr>
-                <a:solidFill>
-                  <a:schemeClr val="tx1"/>
-                </a:solidFill>
-                <a:latin typeface="Arial" charset="0"/>
-              </a:defRPr>
-            </a:lvl3pPr>
-            <a:lvl4pPr marL="1125538" defTabSz="749300">
-              <a:defRPr>
-                <a:solidFill>
-                  <a:schemeClr val="tx1"/>
-                </a:solidFill>
-                <a:latin typeface="Arial" charset="0"/>
-              </a:defRPr>
-            </a:lvl4pPr>
-            <a:lvl5pPr marL="1500188" defTabSz="749300">
-              <a:defRPr>
-                <a:solidFill>
-                  <a:schemeClr val="tx1"/>
-                </a:solidFill>
-                <a:latin typeface="Arial" charset="0"/>
-              </a:defRPr>
-            </a:lvl5pPr>
-            <a:lvl6pPr marL="1957388" defTabSz="749300" fontAlgn="base">
-              <a:spcBef>
-                <a:spcPct val="0"/>
-              </a:spcBef>
-              <a:spcAft>
-                <a:spcPct val="0"/>
-              </a:spcAft>
-              <a:defRPr>
-                <a:solidFill>
-                  <a:schemeClr val="tx1"/>
-                </a:solidFill>
-                <a:latin typeface="Arial" charset="0"/>
-              </a:defRPr>
-            </a:lvl6pPr>
-            <a:lvl7pPr marL="2414588" defTabSz="749300" fontAlgn="base">
-              <a:spcBef>
-                <a:spcPct val="0"/>
-              </a:spcBef>
-              <a:spcAft>
-                <a:spcPct val="0"/>
-              </a:spcAft>
-              <a:defRPr>
-                <a:solidFill>
-                  <a:schemeClr val="tx1"/>
-                </a:solidFill>
-                <a:latin typeface="Arial" charset="0"/>
-              </a:defRPr>
-            </a:lvl7pPr>
-            <a:lvl8pPr marL="2871788" defTabSz="749300" fontAlgn="base">
-              <a:spcBef>
-                <a:spcPct val="0"/>
-              </a:spcBef>
-              <a:spcAft>
-                <a:spcPct val="0"/>
-              </a:spcAft>
-              <a:defRPr>
-                <a:solidFill>
-                  <a:schemeClr val="tx1"/>
-                </a:solidFill>
-                <a:latin typeface="Arial" charset="0"/>
-              </a:defRPr>
-            </a:lvl8pPr>
-            <a:lvl9pPr marL="3328988" defTabSz="749300" fontAlgn="base">
-              <a:spcBef>
-                <a:spcPct val="0"/>
-              </a:spcBef>
-              <a:spcAft>
-                <a:spcPct val="0"/>
-              </a:spcAft>
-              <a:defRPr>
-                <a:solidFill>
-                  <a:schemeClr val="tx1"/>
-                </a:solidFill>
-                <a:latin typeface="Arial" charset="0"/>
-              </a:defRPr>
-            </a:lvl9pPr>
-          </a:lstStyle>
-          <a:p>
-            <a:pPr algn="ctr" eaLnBrk="0" hangingPunct="0">
-              <a:spcBef>
-                <a:spcPct val="50000"/>
-              </a:spcBef>
-            </a:pPr>
-            <a:r>
-              <a:rPr lang="en-US" sz="3000" b="1" dirty="0">
-                <a:solidFill>
-                  <a:srgbClr val="F8F8F8"/>
-                </a:solidFill>
-                <a:latin typeface="+mj-lt"/>
-              </a:rPr>
-              <a:t>Highlights</a:t>
-            </a:r>
-          </a:p>
-        </p:txBody>
-      </p:sp>
-      <p:sp>
-        <p:nvSpPr>
           <p:cNvPr id="2609" name="Text Box 561"/>
           <p:cNvSpPr txBox="1">
             <a:spLocks noChangeArrowheads="1"/>
@@ -9821,7 +9710,7 @@
         </p:nvSpPr>
         <p:spPr bwMode="auto">
           <a:xfrm>
-            <a:off x="24091900" y="17758287"/>
+            <a:off x="24107091" y="23969013"/>
             <a:ext cx="11082338" cy="533400"/>
           </a:xfrm>
           <a:prstGeom prst="rect">
@@ -9937,7 +9826,7 @@
         </p:nvSpPr>
         <p:spPr bwMode="auto">
           <a:xfrm>
-            <a:off x="24091900" y="25377775"/>
+            <a:off x="24135396" y="28413325"/>
             <a:ext cx="11082338" cy="533400"/>
           </a:xfrm>
           <a:prstGeom prst="rect">
@@ -10073,122 +9962,6 @@
       </p:sp>
       <p:sp>
         <p:nvSpPr>
-          <p:cNvPr id="2611" name="Text Box 563"/>
-          <p:cNvSpPr txBox="1">
-            <a:spLocks noChangeArrowheads="1"/>
-          </p:cNvSpPr>
-          <p:nvPr/>
-        </p:nvSpPr>
-        <p:spPr bwMode="auto">
-          <a:xfrm>
-            <a:off x="24091900" y="32115125"/>
-            <a:ext cx="11082338" cy="533400"/>
-          </a:xfrm>
-          <a:prstGeom prst="rect">
-            <a:avLst/>
-          </a:prstGeom>
-          <a:solidFill>
-            <a:srgbClr val="002060"/>
-          </a:solidFill>
-          <a:ln>
-            <a:noFill/>
-          </a:ln>
-          <a:effectLst/>
-        </p:spPr>
-        <p:txBody>
-          <a:bodyPr lIns="74857" tIns="37421" rIns="74857" bIns="37421">
-            <a:spAutoFit/>
-          </a:bodyPr>
-          <a:lstStyle>
-            <a:defPPr>
-              <a:defRPr lang="en-US"/>
-            </a:defPPr>
-            <a:lvl1pPr algn="ctr" defTabSz="749300" eaLnBrk="0" hangingPunct="0">
-              <a:spcBef>
-                <a:spcPct val="50000"/>
-              </a:spcBef>
-              <a:defRPr sz="3000" b="1">
-                <a:solidFill>
-                  <a:srgbClr val="F8F8F8"/>
-                </a:solidFill>
-                <a:latin typeface="+mj-lt"/>
-              </a:defRPr>
-            </a:lvl1pPr>
-            <a:lvl2pPr marL="374650" defTabSz="749300">
-              <a:defRPr>
-                <a:latin typeface="Arial" charset="0"/>
-              </a:defRPr>
-            </a:lvl2pPr>
-            <a:lvl3pPr marL="749300" defTabSz="749300">
-              <a:defRPr>
-                <a:latin typeface="Arial" charset="0"/>
-              </a:defRPr>
-            </a:lvl3pPr>
-            <a:lvl4pPr marL="1125538" defTabSz="749300">
-              <a:defRPr>
-                <a:latin typeface="Arial" charset="0"/>
-              </a:defRPr>
-            </a:lvl4pPr>
-            <a:lvl5pPr marL="1500188" defTabSz="749300">
-              <a:defRPr>
-                <a:latin typeface="Arial" charset="0"/>
-              </a:defRPr>
-            </a:lvl5pPr>
-            <a:lvl6pPr marL="1957388" defTabSz="749300" fontAlgn="base">
-              <a:spcBef>
-                <a:spcPct val="0"/>
-              </a:spcBef>
-              <a:spcAft>
-                <a:spcPct val="0"/>
-              </a:spcAft>
-              <a:defRPr>
-                <a:latin typeface="Arial" charset="0"/>
-              </a:defRPr>
-            </a:lvl6pPr>
-            <a:lvl7pPr marL="2414588" defTabSz="749300" fontAlgn="base">
-              <a:spcBef>
-                <a:spcPct val="0"/>
-              </a:spcBef>
-              <a:spcAft>
-                <a:spcPct val="0"/>
-              </a:spcAft>
-              <a:defRPr>
-                <a:latin typeface="Arial" charset="0"/>
-              </a:defRPr>
-            </a:lvl7pPr>
-            <a:lvl8pPr marL="2871788" defTabSz="749300" fontAlgn="base">
-              <a:spcBef>
-                <a:spcPct val="0"/>
-              </a:spcBef>
-              <a:spcAft>
-                <a:spcPct val="0"/>
-              </a:spcAft>
-              <a:defRPr>
-                <a:latin typeface="Arial" charset="0"/>
-              </a:defRPr>
-            </a:lvl8pPr>
-            <a:lvl9pPr marL="3328988" defTabSz="749300" fontAlgn="base">
-              <a:spcBef>
-                <a:spcPct val="0"/>
-              </a:spcBef>
-              <a:spcAft>
-                <a:spcPct val="0"/>
-              </a:spcAft>
-              <a:defRPr>
-                <a:latin typeface="Arial" charset="0"/>
-              </a:defRPr>
-            </a:lvl9pPr>
-          </a:lstStyle>
-          <a:p>
-            <a:r>
-              <a:rPr lang="en-US" dirty="0"/>
-              <a:t>Authors  Contact Details</a:t>
-            </a:r>
-          </a:p>
-        </p:txBody>
-      </p:sp>
-      <p:sp>
-        <p:nvSpPr>
           <p:cNvPr id="2613" name="Text Box 565"/>
           <p:cNvSpPr txBox="1">
             <a:spLocks noChangeArrowheads="1"/>
@@ -10197,7 +9970,7 @@
         </p:nvSpPr>
         <p:spPr bwMode="auto">
           <a:xfrm>
-            <a:off x="24091900" y="26428701"/>
+            <a:off x="24231824" y="29257436"/>
             <a:ext cx="10971213" cy="5497073"/>
           </a:xfrm>
           <a:prstGeom prst="rect">
@@ -10377,7 +10150,7 @@
         </p:nvSpPr>
         <p:spPr bwMode="auto">
           <a:xfrm>
-            <a:off x="24244300" y="18291688"/>
+            <a:off x="24190959" y="26416924"/>
             <a:ext cx="10818813" cy="1557533"/>
           </a:xfrm>
           <a:prstGeom prst="rect">
@@ -10524,7 +10297,7 @@
         </p:blipFill>
         <p:spPr bwMode="auto">
           <a:xfrm>
-            <a:off x="768351" y="783390"/>
+            <a:off x="791211" y="783390"/>
             <a:ext cx="2736849" cy="2664660"/>
           </a:xfrm>
           <a:prstGeom prst="rect">
@@ -10542,163 +10315,6 @@
       </p:pic>
       <p:sp>
         <p:nvSpPr>
-          <p:cNvPr id="20" name="TextBox 19"/>
-          <p:cNvSpPr txBox="1"/>
-          <p:nvPr/>
-        </p:nvSpPr>
-        <p:spPr>
-          <a:xfrm>
-            <a:off x="24091900" y="32768840"/>
-            <a:ext cx="11082338" cy="2400657"/>
-          </a:xfrm>
-          <a:prstGeom prst="rect">
-            <a:avLst/>
-          </a:prstGeom>
-          <a:noFill/>
-        </p:spPr>
-        <p:txBody>
-          <a:bodyPr wrap="square" tIns="0" rIns="91440" bIns="0" rtlCol="0">
-            <a:spAutoFit/>
-          </a:bodyPr>
-          <a:lstStyle/>
-          <a:p>
-            <a:pPr algn="just" fontAlgn="auto">
-              <a:spcBef>
-                <a:spcPts val="0"/>
-              </a:spcBef>
-              <a:spcAft>
-                <a:spcPts val="0"/>
-              </a:spcAft>
-              <a:defRPr/>
-            </a:pPr>
-            <a:r>
-              <a:rPr lang="en-GB" sz="2800" dirty="0" err="1">
-                <a:latin typeface="Arial Black" pitchFamily="34" charset="0"/>
-                <a:ea typeface="PMingLiU"/>
-              </a:rPr>
-              <a:t>Bhartiya</a:t>
-            </a:r>
-            <a:r>
-              <a:rPr lang="en-GB" sz="2800" dirty="0">
-                <a:latin typeface="Arial Black" pitchFamily="34" charset="0"/>
-                <a:ea typeface="PMingLiU"/>
-              </a:rPr>
-              <a:t> </a:t>
-            </a:r>
-            <a:r>
-              <a:rPr lang="en-GB" sz="2800" dirty="0" err="1">
-                <a:latin typeface="Arial Black" pitchFamily="34" charset="0"/>
-                <a:ea typeface="PMingLiU"/>
-              </a:rPr>
-              <a:t>Vidya</a:t>
-            </a:r>
-            <a:r>
-              <a:rPr lang="en-GB" sz="2800" dirty="0">
-                <a:latin typeface="Arial Black" pitchFamily="34" charset="0"/>
-                <a:ea typeface="PMingLiU"/>
-              </a:rPr>
-              <a:t> </a:t>
-            </a:r>
-            <a:r>
-              <a:rPr lang="en-GB" sz="2800" dirty="0" err="1">
-                <a:latin typeface="Arial Black" pitchFamily="34" charset="0"/>
-                <a:ea typeface="PMingLiU"/>
-              </a:rPr>
-              <a:t>Bhavan’s</a:t>
-            </a:r>
-            <a:r>
-              <a:rPr lang="en-GB" sz="2800" dirty="0">
-                <a:latin typeface="Arial Black" pitchFamily="34" charset="0"/>
-                <a:ea typeface="PMingLiU"/>
-              </a:rPr>
-              <a:t>, </a:t>
-            </a:r>
-            <a:r>
-              <a:rPr lang="en-GB" sz="2800" dirty="0" err="1">
-                <a:latin typeface="Arial Black" pitchFamily="34" charset="0"/>
-                <a:ea typeface="PMingLiU"/>
-              </a:rPr>
-              <a:t>Sardar</a:t>
-            </a:r>
-            <a:r>
-              <a:rPr lang="en-GB" sz="2800" dirty="0">
-                <a:latin typeface="Arial Black" pitchFamily="34" charset="0"/>
-                <a:ea typeface="PMingLiU"/>
-              </a:rPr>
-              <a:t> Patel Institute of Technology, Electronics Engineering Department, </a:t>
-            </a:r>
-            <a:r>
-              <a:rPr lang="en-US" sz="2800" dirty="0">
-                <a:latin typeface="Arial Black" pitchFamily="34" charset="0"/>
-              </a:rPr>
-              <a:t>Andheri (W), Mumbai-400058.</a:t>
-            </a:r>
-          </a:p>
-          <a:p>
-            <a:pPr algn="just" fontAlgn="auto">
-              <a:spcBef>
-                <a:spcPts val="0"/>
-              </a:spcBef>
-              <a:spcAft>
-                <a:spcPts val="0"/>
-              </a:spcAft>
-              <a:defRPr/>
-            </a:pPr>
-            <a:endParaRPr lang="en-US" sz="1600" dirty="0">
-              <a:latin typeface="Arial Black" pitchFamily="34" charset="0"/>
-            </a:endParaRPr>
-          </a:p>
-          <a:p>
-            <a:pPr algn="just" fontAlgn="auto">
-              <a:spcBef>
-                <a:spcPts val="0"/>
-              </a:spcBef>
-              <a:spcAft>
-                <a:spcPts val="0"/>
-              </a:spcAft>
-              <a:defRPr/>
-            </a:pPr>
-            <a:r>
-              <a:rPr lang="en-US" sz="2800" dirty="0">
-                <a:latin typeface="Arial Black" pitchFamily="34" charset="0"/>
-              </a:rPr>
-              <a:t>chirag.shah@spit.ac.in,+9</a:t>
-            </a:r>
-            <a:r>
-              <a:rPr lang="en-GB" sz="2800" dirty="0">
-                <a:latin typeface="Arial Black" pitchFamily="34" charset="0"/>
-              </a:rPr>
-              <a:t>1769168825</a:t>
-            </a:r>
-            <a:r>
-              <a:rPr lang="en-US" sz="2800" dirty="0">
-                <a:latin typeface="Arial Black" pitchFamily="34" charset="0"/>
-              </a:rPr>
-              <a:t> (M)</a:t>
-            </a:r>
-          </a:p>
-          <a:p>
-            <a:pPr algn="just" fontAlgn="auto">
-              <a:spcBef>
-                <a:spcPts val="0"/>
-              </a:spcBef>
-              <a:spcAft>
-                <a:spcPts val="0"/>
-              </a:spcAft>
-              <a:defRPr/>
-            </a:pPr>
-            <a:r>
-              <a:rPr lang="en-US" sz="2800" dirty="0">
-                <a:latin typeface="Arial Black" pitchFamily="34" charset="0"/>
-              </a:rPr>
-              <a:t>srijal.poojari@spit.ac.in,  +91</a:t>
-            </a:r>
-            <a:endParaRPr lang="en-US" dirty="0"/>
-          </a:p>
-        </p:txBody>
-      </p:sp>
-      <p:sp>
-        <p:nvSpPr>
           <p:cNvPr id="2050" name="Rectangle 2"/>
           <p:cNvSpPr>
             <a:spLocks noChangeArrowheads="1"/>
@@ -10707,7 +10323,7 @@
         </p:nvSpPr>
         <p:spPr bwMode="auto">
           <a:xfrm>
-            <a:off x="0" y="0"/>
+            <a:off x="22860" y="0"/>
             <a:ext cx="35999738" cy="0"/>
           </a:xfrm>
           <a:prstGeom prst="rect">
@@ -10745,7 +10361,7 @@
         </p:nvSpPr>
         <p:spPr bwMode="auto">
           <a:xfrm>
-            <a:off x="0" y="0"/>
+            <a:off x="22860" y="0"/>
             <a:ext cx="35999738" cy="0"/>
           </a:xfrm>
           <a:prstGeom prst="rect">
@@ -10778,7 +10394,7 @@
           <p:cNvPr id="51" name="Text Box 473">
             <a:extLst>
               <a:ext uri="{FF2B5EF4-FFF2-40B4-BE49-F238E27FC236}">
-                <a16:creationId xmlns:a16="http://schemas.microsoft.com/office/drawing/2014/main" xmlns="" id="{B81FC9C0-506A-4701-B6B2-1810CDBDF54C}"/>
+                <a16:creationId xmlns="" xmlns:a16="http://schemas.microsoft.com/office/drawing/2014/main" id="{B81FC9C0-506A-4701-B6B2-1810CDBDF54C}"/>
               </a:ext>
             </a:extLst>
           </p:cNvPr>
@@ -10789,7 +10405,7 @@
         </p:nvSpPr>
         <p:spPr bwMode="auto">
           <a:xfrm>
-            <a:off x="776366" y="9872410"/>
+            <a:off x="799226" y="11472610"/>
             <a:ext cx="11083925" cy="533400"/>
           </a:xfrm>
           <a:prstGeom prst="rect">
@@ -10928,7 +10544,7 @@
           <p:cNvPr id="52" name="Text Box 472">
             <a:extLst>
               <a:ext uri="{FF2B5EF4-FFF2-40B4-BE49-F238E27FC236}">
-                <a16:creationId xmlns:a16="http://schemas.microsoft.com/office/drawing/2014/main" xmlns="" id="{95982AEE-5C90-4F17-9477-54C73089B84F}"/>
+                <a16:creationId xmlns="" xmlns:a16="http://schemas.microsoft.com/office/drawing/2014/main" id="{95982AEE-5C90-4F17-9477-54C73089B84F}"/>
               </a:ext>
             </a:extLst>
           </p:cNvPr>
@@ -10939,8 +10555,8 @@
         </p:nvSpPr>
         <p:spPr bwMode="auto">
           <a:xfrm>
-            <a:off x="933905" y="10428203"/>
-            <a:ext cx="10841037" cy="4358300"/>
+            <a:off x="956765" y="12028403"/>
+            <a:ext cx="10841037" cy="1957643"/>
           </a:xfrm>
           <a:prstGeom prst="rect">
             <a:avLst/>
@@ -11061,23 +10677,14 @@
               <a:buChar char="Ø"/>
             </a:pPr>
             <a:r>
-              <a:rPr lang="en-US" sz="2600" dirty="0">
+              <a:rPr lang="en-US" sz="2600" dirty="0" smtClean="0">
                 <a:latin typeface="+mj-lt"/>
               </a:rPr>
-              <a:t>If someone wants to have a meeting spontaneously without booking the room then the he/she will have to go from room to room to check the occupancy status of the room</a:t>
-            </a:r>
-          </a:p>
-          <a:p>
-            <a:pPr algn="just">
-              <a:buFont typeface="Wingdings" pitchFamily="2" charset="2"/>
-              <a:buChar char="Ø"/>
-            </a:pPr>
-            <a:r>
-              <a:rPr lang="en-US" sz="2600" dirty="0">
-                <a:latin typeface="+mj-lt"/>
-              </a:rPr>
-              <a:t>Someone may book the room but if the meeting is cancelled then he/she may not cancel the booking, this may stop others form using it during that time since there is no way to check the occupancy status without actually going to the room</a:t>
-            </a:r>
+              <a:t>Implement a PIR sensor based solution wherein people can view the status of the room (available/occupied) online using web</a:t>
+            </a:r>
+            <a:endParaRPr lang="en-US" sz="2600" dirty="0">
+              <a:latin typeface="+mj-lt"/>
+            </a:endParaRPr>
           </a:p>
         </p:txBody>
       </p:sp>
@@ -11086,7 +10693,7 @@
           <p:cNvPr id="60" name="Text Box 472">
             <a:extLst>
               <a:ext uri="{FF2B5EF4-FFF2-40B4-BE49-F238E27FC236}">
-                <a16:creationId xmlns:a16="http://schemas.microsoft.com/office/drawing/2014/main" xmlns="" id="{EE7868CC-9850-4326-A3AE-448FC57ABFBD}"/>
+                <a16:creationId xmlns="" xmlns:a16="http://schemas.microsoft.com/office/drawing/2014/main" id="{EE7868CC-9850-4326-A3AE-448FC57ABFBD}"/>
               </a:ext>
             </a:extLst>
           </p:cNvPr>
@@ -11097,8 +10704,8 @@
         </p:nvSpPr>
         <p:spPr bwMode="auto">
           <a:xfrm>
-            <a:off x="761451" y="16608426"/>
-            <a:ext cx="10841037" cy="10760052"/>
+            <a:off x="852891" y="15579726"/>
+            <a:ext cx="10841037" cy="7159067"/>
           </a:xfrm>
           <a:prstGeom prst="rect">
             <a:avLst/>
@@ -11270,8 +10877,29 @@
               <a:rPr lang="en-US" sz="2600" dirty="0">
                 <a:latin typeface="+mj-lt"/>
               </a:rPr>
-              <a:t>All the devices are battery powered</a:t>
-            </a:r>
+              <a:t>All the devices are battery </a:t>
+            </a:r>
+            <a:r>
+              <a:rPr lang="en-US" sz="2600" dirty="0" smtClean="0">
+                <a:latin typeface="+mj-lt"/>
+              </a:rPr>
+              <a:t>powered</a:t>
+            </a:r>
+          </a:p>
+          <a:p>
+            <a:pPr algn="just">
+              <a:buFont typeface="Wingdings" pitchFamily="2" charset="2"/>
+              <a:buChar char="Ø"/>
+            </a:pPr>
+            <a:r>
+              <a:rPr lang="en-US" sz="2600" dirty="0" smtClean="0">
+                <a:latin typeface="+mj-lt"/>
+              </a:rPr>
+              <a:t>Since the devices are battery powered – we used a low power voltage regulator. This improved the battery life by 3 X times as the current drawn was 0.3 micro amperes compared to .1 micro ampere by a normal voltage regulator</a:t>
+            </a:r>
+            <a:endParaRPr lang="en-US" sz="2600" dirty="0">
+              <a:latin typeface="+mj-lt"/>
+            </a:endParaRPr>
           </a:p>
           <a:p>
             <a:pPr algn="just">
@@ -11287,72 +10915,9 @@
               <a:buFont typeface="Wingdings" pitchFamily="2" charset="2"/>
               <a:buChar char="Ø"/>
             </a:pPr>
-            <a:r>
-              <a:rPr lang="en-US" sz="2600" dirty="0">
-                <a:latin typeface="+mj-lt"/>
-              </a:rPr>
-              <a:t>We create a complete end-to-end product including getting PCBs manufactured for the devices and designing the web interface</a:t>
-            </a:r>
-          </a:p>
-          <a:p>
-            <a:pPr algn="just">
-              <a:buFont typeface="Wingdings" pitchFamily="2" charset="2"/>
-              <a:buChar char="Ø"/>
-            </a:pPr>
-            <a:r>
-              <a:rPr lang="en-US" sz="2600" dirty="0">
-                <a:latin typeface="+mj-lt"/>
-              </a:rPr>
-              <a:t>We will create a real-time wireless conference room occupancy monitoring system</a:t>
-            </a:r>
-          </a:p>
-          <a:p>
-            <a:pPr algn="just">
-              <a:buFont typeface="Wingdings" pitchFamily="2" charset="2"/>
-              <a:buChar char="Ø"/>
-            </a:pPr>
-            <a:r>
-              <a:rPr lang="en-US" sz="2600" dirty="0">
-                <a:latin typeface="+mj-lt"/>
-              </a:rPr>
-              <a:t>Each room will have one or more devices which will detect the occupancy of the room</a:t>
-            </a:r>
-          </a:p>
-          <a:p>
-            <a:pPr algn="just">
-              <a:buFont typeface="Wingdings" pitchFamily="2" charset="2"/>
-              <a:buChar char="Ø"/>
-            </a:pPr>
-            <a:r>
-              <a:rPr lang="en-US" sz="2600" dirty="0">
-                <a:latin typeface="+mj-lt"/>
-              </a:rPr>
-              <a:t>This data will be uploaded to a central server/device over which will keep track of the occupancy of all the rooms</a:t>
-            </a:r>
-          </a:p>
-          <a:p>
-            <a:pPr algn="just">
-              <a:buFont typeface="Wingdings" pitchFamily="2" charset="2"/>
-              <a:buChar char="Ø"/>
-            </a:pPr>
-            <a:r>
-              <a:rPr lang="en-US" sz="2600" dirty="0">
-                <a:latin typeface="+mj-lt"/>
-              </a:rPr>
-              <a:t>The occupancy of each room can be viewed on a web interface</a:t>
-            </a:r>
-          </a:p>
-          <a:p>
-            <a:pPr algn="just">
-              <a:buFont typeface="Wingdings" pitchFamily="2" charset="2"/>
-              <a:buChar char="Ø"/>
-            </a:pPr>
-            <a:r>
-              <a:rPr lang="en-US" sz="2600" dirty="0">
-                <a:latin typeface="+mj-lt"/>
-              </a:rPr>
-              <a:t>This data can be integrated with the existing mobile app(this is outside the scope of this project)</a:t>
-            </a:r>
+            <a:endParaRPr lang="en-US" sz="2600" dirty="0">
+              <a:latin typeface="+mj-lt"/>
+            </a:endParaRPr>
           </a:p>
           <a:p>
             <a:pPr algn="just">
@@ -11363,15 +10928,6 @@
               <a:latin typeface="+mj-lt"/>
             </a:endParaRPr>
           </a:p>
-          <a:p>
-            <a:pPr algn="just">
-              <a:buFont typeface="Wingdings" pitchFamily="2" charset="2"/>
-              <a:buChar char="Ø"/>
-            </a:pPr>
-            <a:endParaRPr lang="en-US" sz="2600" dirty="0">
-              <a:latin typeface="+mj-lt"/>
-            </a:endParaRPr>
-          </a:p>
         </p:txBody>
       </p:sp>
       <p:sp>
@@ -11379,7 +10935,7 @@
           <p:cNvPr id="61" name="Text Box 495">
             <a:extLst>
               <a:ext uri="{FF2B5EF4-FFF2-40B4-BE49-F238E27FC236}">
-                <a16:creationId xmlns:a16="http://schemas.microsoft.com/office/drawing/2014/main" xmlns="" id="{16E494E8-71EF-49AA-9C9E-6753DFB184CA}"/>
+                <a16:creationId xmlns="" xmlns:a16="http://schemas.microsoft.com/office/drawing/2014/main" id="{16E494E8-71EF-49AA-9C9E-6753DFB184CA}"/>
               </a:ext>
             </a:extLst>
           </p:cNvPr>
@@ -11390,7 +10946,7 @@
         </p:nvSpPr>
         <p:spPr bwMode="auto">
           <a:xfrm>
-            <a:off x="24112536" y="5259473"/>
+            <a:off x="24135396" y="9453292"/>
             <a:ext cx="11082338" cy="533400"/>
           </a:xfrm>
           <a:prstGeom prst="rect">
@@ -11526,10 +11082,10 @@
       </p:sp>
       <p:sp>
         <p:nvSpPr>
-          <p:cNvPr id="62" name="Text Box 472">
+          <p:cNvPr id="65" name="Text Box 495">
             <a:extLst>
               <a:ext uri="{FF2B5EF4-FFF2-40B4-BE49-F238E27FC236}">
-                <a16:creationId xmlns:a16="http://schemas.microsoft.com/office/drawing/2014/main" xmlns="" id="{F1A52443-3352-4417-A2E2-ACBDAD15BBAC}"/>
+                <a16:creationId xmlns="" xmlns:a16="http://schemas.microsoft.com/office/drawing/2014/main" id="{7446E45C-B335-4042-9DBF-538437EA5B38}"/>
               </a:ext>
             </a:extLst>
           </p:cNvPr>
@@ -11540,7 +11096,157 @@
         </p:nvSpPr>
         <p:spPr bwMode="auto">
           <a:xfrm>
-            <a:off x="12471127" y="5979402"/>
+            <a:off x="24120699" y="5266659"/>
+            <a:ext cx="11082338" cy="533400"/>
+          </a:xfrm>
+          <a:prstGeom prst="rect">
+            <a:avLst/>
+          </a:prstGeom>
+          <a:solidFill>
+            <a:srgbClr val="002060"/>
+          </a:solidFill>
+          <a:ln>
+            <a:noFill/>
+          </a:ln>
+          <a:effectLst/>
+        </p:spPr>
+        <p:txBody>
+          <a:bodyPr lIns="74857" tIns="37421" rIns="74857" bIns="37421">
+            <a:spAutoFit/>
+          </a:bodyPr>
+          <a:lstStyle>
+            <a:lvl1pPr defTabSz="749300">
+              <a:defRPr>
+                <a:solidFill>
+                  <a:schemeClr val="tx1"/>
+                </a:solidFill>
+                <a:latin typeface="Arial" charset="0"/>
+              </a:defRPr>
+            </a:lvl1pPr>
+            <a:lvl2pPr marL="374650" defTabSz="749300">
+              <a:defRPr>
+                <a:solidFill>
+                  <a:schemeClr val="tx1"/>
+                </a:solidFill>
+                <a:latin typeface="Arial" charset="0"/>
+              </a:defRPr>
+            </a:lvl2pPr>
+            <a:lvl3pPr marL="749300" defTabSz="749300">
+              <a:defRPr>
+                <a:solidFill>
+                  <a:schemeClr val="tx1"/>
+                </a:solidFill>
+                <a:latin typeface="Arial" charset="0"/>
+              </a:defRPr>
+            </a:lvl3pPr>
+            <a:lvl4pPr marL="1125538" defTabSz="749300">
+              <a:defRPr>
+                <a:solidFill>
+                  <a:schemeClr val="tx1"/>
+                </a:solidFill>
+                <a:latin typeface="Arial" charset="0"/>
+              </a:defRPr>
+            </a:lvl4pPr>
+            <a:lvl5pPr marL="1500188" defTabSz="749300">
+              <a:defRPr>
+                <a:solidFill>
+                  <a:schemeClr val="tx1"/>
+                </a:solidFill>
+                <a:latin typeface="Arial" charset="0"/>
+              </a:defRPr>
+            </a:lvl5pPr>
+            <a:lvl6pPr marL="1957388" defTabSz="749300" fontAlgn="base">
+              <a:spcBef>
+                <a:spcPct val="0"/>
+              </a:spcBef>
+              <a:spcAft>
+                <a:spcPct val="0"/>
+              </a:spcAft>
+              <a:defRPr>
+                <a:solidFill>
+                  <a:schemeClr val="tx1"/>
+                </a:solidFill>
+                <a:latin typeface="Arial" charset="0"/>
+              </a:defRPr>
+            </a:lvl6pPr>
+            <a:lvl7pPr marL="2414588" defTabSz="749300" fontAlgn="base">
+              <a:spcBef>
+                <a:spcPct val="0"/>
+              </a:spcBef>
+              <a:spcAft>
+                <a:spcPct val="0"/>
+              </a:spcAft>
+              <a:defRPr>
+                <a:solidFill>
+                  <a:schemeClr val="tx1"/>
+                </a:solidFill>
+                <a:latin typeface="Arial" charset="0"/>
+              </a:defRPr>
+            </a:lvl7pPr>
+            <a:lvl8pPr marL="2871788" defTabSz="749300" fontAlgn="base">
+              <a:spcBef>
+                <a:spcPct val="0"/>
+              </a:spcBef>
+              <a:spcAft>
+                <a:spcPct val="0"/>
+              </a:spcAft>
+              <a:defRPr>
+                <a:solidFill>
+                  <a:schemeClr val="tx1"/>
+                </a:solidFill>
+                <a:latin typeface="Arial" charset="0"/>
+              </a:defRPr>
+            </a:lvl8pPr>
+            <a:lvl9pPr marL="3328988" defTabSz="749300" fontAlgn="base">
+              <a:spcBef>
+                <a:spcPct val="0"/>
+              </a:spcBef>
+              <a:spcAft>
+                <a:spcPct val="0"/>
+              </a:spcAft>
+              <a:defRPr>
+                <a:solidFill>
+                  <a:schemeClr val="tx1"/>
+                </a:solidFill>
+                <a:latin typeface="Arial" charset="0"/>
+              </a:defRPr>
+            </a:lvl9pPr>
+          </a:lstStyle>
+          <a:p>
+            <a:pPr algn="ctr" eaLnBrk="0" hangingPunct="0">
+              <a:spcBef>
+                <a:spcPct val="50000"/>
+              </a:spcBef>
+            </a:pPr>
+            <a:r>
+              <a:rPr lang="en-US" sz="3000" b="1" dirty="0">
+                <a:solidFill>
+                  <a:srgbClr val="F8F8F8"/>
+                </a:solidFill>
+                <a:latin typeface="+mj-lt"/>
+              </a:rPr>
+              <a:t>Highlights</a:t>
+            </a:r>
+          </a:p>
+        </p:txBody>
+      </p:sp>
+      <p:sp>
+        <p:nvSpPr>
+          <p:cNvPr id="66" name="Text Box 472">
+            <a:extLst>
+              <a:ext uri="{FF2B5EF4-FFF2-40B4-BE49-F238E27FC236}">
+                <a16:creationId xmlns="" xmlns:a16="http://schemas.microsoft.com/office/drawing/2014/main" id="{0E08127E-C259-440C-B131-0752B63EF0F8}"/>
+              </a:ext>
+            </a:extLst>
+          </p:cNvPr>
+          <p:cNvSpPr txBox="1">
+            <a:spLocks noChangeArrowheads="1"/>
+          </p:cNvSpPr>
+          <p:nvPr/>
+        </p:nvSpPr>
+        <p:spPr bwMode="auto">
+          <a:xfrm>
+            <a:off x="24241349" y="6135630"/>
             <a:ext cx="10841037" cy="2757862"/>
           </a:xfrm>
           <a:prstGeom prst="rect">
@@ -11657,13 +11363,19 @@
             </a:lvl9pPr>
           </a:lstStyle>
           <a:p>
-            <a:pPr algn="just"/>
+            <a:pPr marL="457200" indent="-457200" algn="just">
+              <a:buFont typeface="Wingdings" pitchFamily="2" charset="2"/>
+              <a:buChar char="Ø"/>
+            </a:pPr>
             <a:r>
               <a:rPr lang="en-US" sz="2600" dirty="0">
                 <a:latin typeface="+mj-lt"/>
               </a:rPr>
               <a:t>We created a complete end-to-end product </a:t>
             </a:r>
+            <a:endParaRPr lang="en-US" sz="2600" dirty="0">
+              <a:latin typeface="+mj-lt"/>
+            </a:endParaRPr>
           </a:p>
           <a:p>
             <a:pPr marL="457200" indent="-457200" algn="just">
@@ -11671,10 +11383,28 @@
               <a:buChar char="Ø"/>
             </a:pPr>
             <a:r>
+              <a:rPr lang="en-US" sz="2600" dirty="0" smtClean="0">
+                <a:latin typeface="+mj-lt"/>
+              </a:rPr>
+              <a:t>Designed a network of wireless battery </a:t>
+            </a:r>
+            <a:r>
               <a:rPr lang="en-US" sz="2600" dirty="0">
                 <a:latin typeface="+mj-lt"/>
               </a:rPr>
-              <a:t>Got the PCBs manufactured for the devices</a:t>
+              <a:t>operated </a:t>
+            </a:r>
+            <a:r>
+              <a:rPr lang="en-US" sz="2600" dirty="0" err="1">
+                <a:latin typeface="+mj-lt"/>
+              </a:rPr>
+              <a:t>devicesPCBs</a:t>
+            </a:r>
+            <a:r>
+              <a:rPr lang="en-US" sz="2600" dirty="0">
+                <a:latin typeface="+mj-lt"/>
+              </a:rPr>
+              <a:t> professionally manufactured</a:t>
             </a:r>
           </a:p>
           <a:p>
@@ -11686,7 +11416,13 @@
               <a:rPr lang="en-US" sz="2600" dirty="0">
                 <a:latin typeface="+mj-lt"/>
               </a:rPr>
-              <a:t>3D printed the product box</a:t>
+              <a:t>3D printed the </a:t>
+            </a:r>
+            <a:r>
+              <a:rPr lang="en-US" sz="2600" dirty="0" smtClean="0">
+                <a:latin typeface="+mj-lt"/>
+              </a:rPr>
+              <a:t>product housing</a:t>
             </a:r>
           </a:p>
           <a:p>
@@ -11695,10 +11431,16 @@
               <a:buChar char="Ø"/>
             </a:pPr>
             <a:r>
+              <a:rPr lang="en-US" sz="2600" dirty="0" smtClean="0">
+                <a:latin typeface="+mj-lt"/>
+              </a:rPr>
+              <a:t>Designed </a:t>
+            </a:r>
+            <a:r>
               <a:rPr lang="en-US" sz="2600" dirty="0">
                 <a:latin typeface="+mj-lt"/>
               </a:rPr>
-              <a:t>Designed the web </a:t>
+              <a:t>the web </a:t>
             </a:r>
             <a:r>
               <a:rPr lang="en-US" sz="2600" dirty="0" smtClean="0">
@@ -11710,26 +11452,164 @@
               <a:latin typeface="+mj-lt"/>
             </a:endParaRPr>
           </a:p>
-          <a:p>
-            <a:pPr marL="457200" indent="-457200" algn="just">
-              <a:buFont typeface="Wingdings" pitchFamily="2" charset="2"/>
-              <a:buChar char="Ø"/>
-            </a:pPr>
-            <a:r>
-              <a:rPr lang="en-US" sz="2600" dirty="0">
-                <a:latin typeface="+mj-lt"/>
-              </a:rPr>
-              <a:t>Created a real time wi-fi mesh</a:t>
-            </a:r>
-          </a:p>
         </p:txBody>
       </p:sp>
       <p:sp>
         <p:nvSpPr>
-          <p:cNvPr id="64" name="Text Box 472">
+          <p:cNvPr id="24" name="Text Box 495"/>
+          <p:cNvSpPr txBox="1">
+            <a:spLocks noChangeArrowheads="1"/>
+          </p:cNvSpPr>
+          <p:nvPr/>
+        </p:nvSpPr>
+        <p:spPr bwMode="auto">
+          <a:xfrm>
+            <a:off x="750970" y="25509906"/>
+            <a:ext cx="11082338" cy="533400"/>
+          </a:xfrm>
+          <a:prstGeom prst="rect">
+            <a:avLst/>
+          </a:prstGeom>
+          <a:solidFill>
+            <a:srgbClr val="002060"/>
+          </a:solidFill>
+          <a:ln>
+            <a:noFill/>
+          </a:ln>
+          <a:effectLst/>
+        </p:spPr>
+        <p:txBody>
+          <a:bodyPr lIns="74857" tIns="37421" rIns="74857" bIns="37421">
+            <a:spAutoFit/>
+          </a:bodyPr>
+          <a:lstStyle>
+            <a:lvl1pPr defTabSz="749300">
+              <a:defRPr>
+                <a:solidFill>
+                  <a:schemeClr val="tx1"/>
+                </a:solidFill>
+                <a:latin typeface="Arial" charset="0"/>
+              </a:defRPr>
+            </a:lvl1pPr>
+            <a:lvl2pPr marL="374650" defTabSz="749300">
+              <a:defRPr>
+                <a:solidFill>
+                  <a:schemeClr val="tx1"/>
+                </a:solidFill>
+                <a:latin typeface="Arial" charset="0"/>
+              </a:defRPr>
+            </a:lvl2pPr>
+            <a:lvl3pPr marL="749300" defTabSz="749300">
+              <a:defRPr>
+                <a:solidFill>
+                  <a:schemeClr val="tx1"/>
+                </a:solidFill>
+                <a:latin typeface="Arial" charset="0"/>
+              </a:defRPr>
+            </a:lvl3pPr>
+            <a:lvl4pPr marL="1125538" defTabSz="749300">
+              <a:defRPr>
+                <a:solidFill>
+                  <a:schemeClr val="tx1"/>
+                </a:solidFill>
+                <a:latin typeface="Arial" charset="0"/>
+              </a:defRPr>
+            </a:lvl4pPr>
+            <a:lvl5pPr marL="1500188" defTabSz="749300">
+              <a:defRPr>
+                <a:solidFill>
+                  <a:schemeClr val="tx1"/>
+                </a:solidFill>
+                <a:latin typeface="Arial" charset="0"/>
+              </a:defRPr>
+            </a:lvl5pPr>
+            <a:lvl6pPr marL="1957388" defTabSz="749300" fontAlgn="base">
+              <a:spcBef>
+                <a:spcPct val="0"/>
+              </a:spcBef>
+              <a:spcAft>
+                <a:spcPct val="0"/>
+              </a:spcAft>
+              <a:defRPr>
+                <a:solidFill>
+                  <a:schemeClr val="tx1"/>
+                </a:solidFill>
+                <a:latin typeface="Arial" charset="0"/>
+              </a:defRPr>
+            </a:lvl6pPr>
+            <a:lvl7pPr marL="2414588" defTabSz="749300" fontAlgn="base">
+              <a:spcBef>
+                <a:spcPct val="0"/>
+              </a:spcBef>
+              <a:spcAft>
+                <a:spcPct val="0"/>
+              </a:spcAft>
+              <a:defRPr>
+                <a:solidFill>
+                  <a:schemeClr val="tx1"/>
+                </a:solidFill>
+                <a:latin typeface="Arial" charset="0"/>
+              </a:defRPr>
+            </a:lvl7pPr>
+            <a:lvl8pPr marL="2871788" defTabSz="749300" fontAlgn="base">
+              <a:spcBef>
+                <a:spcPct val="0"/>
+              </a:spcBef>
+              <a:spcAft>
+                <a:spcPct val="0"/>
+              </a:spcAft>
+              <a:defRPr>
+                <a:solidFill>
+                  <a:schemeClr val="tx1"/>
+                </a:solidFill>
+                <a:latin typeface="Arial" charset="0"/>
+              </a:defRPr>
+            </a:lvl8pPr>
+            <a:lvl9pPr marL="3328988" defTabSz="749300" fontAlgn="base">
+              <a:spcBef>
+                <a:spcPct val="0"/>
+              </a:spcBef>
+              <a:spcAft>
+                <a:spcPct val="0"/>
+              </a:spcAft>
+              <a:defRPr>
+                <a:solidFill>
+                  <a:schemeClr val="tx1"/>
+                </a:solidFill>
+                <a:latin typeface="Arial" charset="0"/>
+              </a:defRPr>
+            </a:lvl9pPr>
+          </a:lstStyle>
+          <a:p>
+            <a:pPr algn="ctr" eaLnBrk="0" hangingPunct="0">
+              <a:spcBef>
+                <a:spcPct val="50000"/>
+              </a:spcBef>
+            </a:pPr>
+            <a:r>
+              <a:rPr lang="en-US" sz="3000" b="1" dirty="0" smtClean="0">
+                <a:solidFill>
+                  <a:srgbClr val="F8F8F8"/>
+                </a:solidFill>
+                <a:latin typeface="+mj-lt"/>
+              </a:rPr>
+              <a:t>Work Done</a:t>
+            </a:r>
+            <a:endParaRPr lang="en-US" sz="3000" b="1" dirty="0">
+              <a:solidFill>
+                <a:srgbClr val="F8F8F8"/>
+              </a:solidFill>
+              <a:latin typeface="+mj-lt"/>
+            </a:endParaRPr>
+          </a:p>
+        </p:txBody>
+      </p:sp>
+      <p:sp>
+        <p:nvSpPr>
+          <p:cNvPr id="25" name="Text Box 472">
             <a:extLst>
               <a:ext uri="{FF2B5EF4-FFF2-40B4-BE49-F238E27FC236}">
-                <a16:creationId xmlns:a16="http://schemas.microsoft.com/office/drawing/2014/main" xmlns="" id="{E01CC889-81FD-4228-B413-BD3A05F2EB27}"/>
+                <a16:creationId xmlns="" xmlns:a16="http://schemas.microsoft.com/office/drawing/2014/main" id="{F1A52443-3352-4417-A2E2-ACBDAD15BBAC}"/>
               </a:ext>
             </a:extLst>
           </p:cNvPr>
@@ -11740,7 +11620,7 @@
         </p:nvSpPr>
         <p:spPr bwMode="auto">
           <a:xfrm>
-            <a:off x="24084231" y="6400883"/>
+            <a:off x="899970" y="26362773"/>
             <a:ext cx="10841037" cy="1957643"/>
           </a:xfrm>
           <a:prstGeom prst="rect">
@@ -11857,43 +11737,100 @@
             </a:lvl9pPr>
           </a:lstStyle>
           <a:p>
-            <a:pPr algn="just">
+            <a:pPr marL="457200" indent="-457200" algn="just">
               <a:buFont typeface="Wingdings" pitchFamily="2" charset="2"/>
               <a:buChar char="Ø"/>
             </a:pPr>
             <a:r>
-              <a:rPr lang="en-US" sz="2600" b="1" dirty="0">
+              <a:rPr lang="en-US" sz="2600" dirty="0" smtClean="0">
                 <a:latin typeface="+mj-lt"/>
               </a:rPr>
-              <a:t>Here are a few photos of the end product</a:t>
-            </a:r>
-          </a:p>
-          <a:p>
-            <a:pPr algn="just">
-              <a:buFont typeface="Wingdings" pitchFamily="2" charset="2"/>
-              <a:buChar char="Ø"/>
-            </a:pPr>
-            <a:endParaRPr lang="en-US" sz="2600" b="1" dirty="0">
+              <a:t>Designed the prototype of the circuit on breadboards which included the microcontroller, radio module and an </a:t>
+            </a:r>
+            <a:r>
+              <a:rPr lang="en-US" sz="2600" dirty="0" err="1" smtClean="0">
+                <a:latin typeface="+mj-lt"/>
+              </a:rPr>
+              <a:t>oled</a:t>
+            </a:r>
+            <a:r>
+              <a:rPr lang="en-US" sz="2600" dirty="0" smtClean="0">
+                <a:latin typeface="+mj-lt"/>
+              </a:rPr>
+              <a:t> display</a:t>
+            </a:r>
+            <a:endParaRPr lang="en-US" sz="2600" dirty="0">
               <a:latin typeface="+mj-lt"/>
             </a:endParaRPr>
           </a:p>
-          <a:p>
-            <a:pPr algn="just">
-              <a:buFont typeface="Wingdings" pitchFamily="2" charset="2"/>
-              <a:buChar char="Ø"/>
-            </a:pPr>
-            <a:endParaRPr lang="en-US" sz="2600" b="1" dirty="0">
-              <a:latin typeface="+mj-lt"/>
-            </a:endParaRPr>
-          </a:p>
         </p:txBody>
       </p:sp>
+      <p:pic>
+        <p:nvPicPr>
+          <p:cNvPr id="5" name="Picture 4"/>
+          <p:cNvPicPr>
+            <a:picLocks noChangeAspect="1"/>
+          </p:cNvPicPr>
+          <p:nvPr/>
+        </p:nvPicPr>
+        <p:blipFill>
+          <a:blip r:embed="rId4" cstate="print">
+            <a:extLst>
+              <a:ext uri="{28A0092B-C50C-407E-A947-70E740481C1C}">
+                <a14:useLocalDpi xmlns:a14="http://schemas.microsoft.com/office/drawing/2010/main" val="0"/>
+              </a:ext>
+            </a:extLst>
+          </a:blip>
+          <a:stretch>
+            <a:fillRect/>
+          </a:stretch>
+        </p:blipFill>
+        <p:spPr>
+          <a:xfrm>
+            <a:off x="12833493" y="13559707"/>
+            <a:ext cx="5019222" cy="3764097"/>
+          </a:xfrm>
+          <a:prstGeom prst="rect">
+            <a:avLst/>
+          </a:prstGeom>
+        </p:spPr>
+      </p:pic>
+      <p:pic>
+        <p:nvPicPr>
+          <p:cNvPr id="6" name="Picture 5"/>
+          <p:cNvPicPr>
+            <a:picLocks noChangeAspect="1"/>
+          </p:cNvPicPr>
+          <p:nvPr/>
+        </p:nvPicPr>
+        <p:blipFill>
+          <a:blip r:embed="rId5" cstate="print">
+            <a:extLst>
+              <a:ext uri="{28A0092B-C50C-407E-A947-70E740481C1C}">
+                <a14:useLocalDpi xmlns:a14="http://schemas.microsoft.com/office/drawing/2010/main" val="0"/>
+              </a:ext>
+            </a:extLst>
+          </a:blip>
+          <a:stretch>
+            <a:fillRect/>
+          </a:stretch>
+        </p:blipFill>
+        <p:spPr>
+          <a:xfrm>
+            <a:off x="17935212" y="13559707"/>
+            <a:ext cx="5018209" cy="3764098"/>
+          </a:xfrm>
+          <a:prstGeom prst="rect">
+            <a:avLst/>
+          </a:prstGeom>
+        </p:spPr>
+      </p:pic>
       <p:sp>
         <p:nvSpPr>
-          <p:cNvPr id="65" name="Text Box 495">
+          <p:cNvPr id="31" name="Text Box 472">
             <a:extLst>
               <a:ext uri="{FF2B5EF4-FFF2-40B4-BE49-F238E27FC236}">
-                <a16:creationId xmlns:a16="http://schemas.microsoft.com/office/drawing/2014/main" xmlns="" id="{7446E45C-B335-4042-9DBF-538437EA5B38}"/>
+                <a16:creationId xmlns="" xmlns:a16="http://schemas.microsoft.com/office/drawing/2014/main" id="{F1A52443-3352-4417-A2E2-ACBDAD15BBAC}"/>
               </a:ext>
             </a:extLst>
           </p:cNvPr>
@@ -11904,158 +11841,8 @@
         </p:nvSpPr>
         <p:spPr bwMode="auto">
           <a:xfrm>
-            <a:off x="12502876" y="31643876"/>
-            <a:ext cx="11082338" cy="533400"/>
-          </a:xfrm>
-          <a:prstGeom prst="rect">
-            <a:avLst/>
-          </a:prstGeom>
-          <a:solidFill>
-            <a:srgbClr val="002060"/>
-          </a:solidFill>
-          <a:ln>
-            <a:noFill/>
-          </a:ln>
-          <a:effectLst/>
-        </p:spPr>
-        <p:txBody>
-          <a:bodyPr lIns="74857" tIns="37421" rIns="74857" bIns="37421">
-            <a:spAutoFit/>
-          </a:bodyPr>
-          <a:lstStyle>
-            <a:lvl1pPr defTabSz="749300">
-              <a:defRPr>
-                <a:solidFill>
-                  <a:schemeClr val="tx1"/>
-                </a:solidFill>
-                <a:latin typeface="Arial" charset="0"/>
-              </a:defRPr>
-            </a:lvl1pPr>
-            <a:lvl2pPr marL="374650" defTabSz="749300">
-              <a:defRPr>
-                <a:solidFill>
-                  <a:schemeClr val="tx1"/>
-                </a:solidFill>
-                <a:latin typeface="Arial" charset="0"/>
-              </a:defRPr>
-            </a:lvl2pPr>
-            <a:lvl3pPr marL="749300" defTabSz="749300">
-              <a:defRPr>
-                <a:solidFill>
-                  <a:schemeClr val="tx1"/>
-                </a:solidFill>
-                <a:latin typeface="Arial" charset="0"/>
-              </a:defRPr>
-            </a:lvl3pPr>
-            <a:lvl4pPr marL="1125538" defTabSz="749300">
-              <a:defRPr>
-                <a:solidFill>
-                  <a:schemeClr val="tx1"/>
-                </a:solidFill>
-                <a:latin typeface="Arial" charset="0"/>
-              </a:defRPr>
-            </a:lvl4pPr>
-            <a:lvl5pPr marL="1500188" defTabSz="749300">
-              <a:defRPr>
-                <a:solidFill>
-                  <a:schemeClr val="tx1"/>
-                </a:solidFill>
-                <a:latin typeface="Arial" charset="0"/>
-              </a:defRPr>
-            </a:lvl5pPr>
-            <a:lvl6pPr marL="1957388" defTabSz="749300" fontAlgn="base">
-              <a:spcBef>
-                <a:spcPct val="0"/>
-              </a:spcBef>
-              <a:spcAft>
-                <a:spcPct val="0"/>
-              </a:spcAft>
-              <a:defRPr>
-                <a:solidFill>
-                  <a:schemeClr val="tx1"/>
-                </a:solidFill>
-                <a:latin typeface="Arial" charset="0"/>
-              </a:defRPr>
-            </a:lvl6pPr>
-            <a:lvl7pPr marL="2414588" defTabSz="749300" fontAlgn="base">
-              <a:spcBef>
-                <a:spcPct val="0"/>
-              </a:spcBef>
-              <a:spcAft>
-                <a:spcPct val="0"/>
-              </a:spcAft>
-              <a:defRPr>
-                <a:solidFill>
-                  <a:schemeClr val="tx1"/>
-                </a:solidFill>
-                <a:latin typeface="Arial" charset="0"/>
-              </a:defRPr>
-            </a:lvl7pPr>
-            <a:lvl8pPr marL="2871788" defTabSz="749300" fontAlgn="base">
-              <a:spcBef>
-                <a:spcPct val="0"/>
-              </a:spcBef>
-              <a:spcAft>
-                <a:spcPct val="0"/>
-              </a:spcAft>
-              <a:defRPr>
-                <a:solidFill>
-                  <a:schemeClr val="tx1"/>
-                </a:solidFill>
-                <a:latin typeface="Arial" charset="0"/>
-              </a:defRPr>
-            </a:lvl8pPr>
-            <a:lvl9pPr marL="3328988" defTabSz="749300" fontAlgn="base">
-              <a:spcBef>
-                <a:spcPct val="0"/>
-              </a:spcBef>
-              <a:spcAft>
-                <a:spcPct val="0"/>
-              </a:spcAft>
-              <a:defRPr>
-                <a:solidFill>
-                  <a:schemeClr val="tx1"/>
-                </a:solidFill>
-                <a:latin typeface="Arial" charset="0"/>
-              </a:defRPr>
-            </a:lvl9pPr>
-          </a:lstStyle>
-          <a:p>
-            <a:pPr algn="ctr" eaLnBrk="0" hangingPunct="0">
-              <a:spcBef>
-                <a:spcPct val="50000"/>
-              </a:spcBef>
-            </a:pPr>
-            <a:r>
-              <a:rPr lang="en-US" sz="3000" b="1" dirty="0">
-                <a:solidFill>
-                  <a:srgbClr val="F8F8F8"/>
-                </a:solidFill>
-                <a:latin typeface="+mj-lt"/>
-              </a:rPr>
-              <a:t>Highlights</a:t>
-            </a:r>
-          </a:p>
-        </p:txBody>
-      </p:sp>
-      <p:sp>
-        <p:nvSpPr>
-          <p:cNvPr id="66" name="Text Box 472">
-            <a:extLst>
-              <a:ext uri="{FF2B5EF4-FFF2-40B4-BE49-F238E27FC236}">
-                <a16:creationId xmlns:a16="http://schemas.microsoft.com/office/drawing/2014/main" xmlns="" id="{0E08127E-C259-440C-B131-0752B63EF0F8}"/>
-              </a:ext>
-            </a:extLst>
-          </p:cNvPr>
-          <p:cNvSpPr txBox="1">
-            <a:spLocks noChangeArrowheads="1"/>
-          </p:cNvSpPr>
-          <p:nvPr/>
-        </p:nvSpPr>
-        <p:spPr bwMode="auto">
-          <a:xfrm>
-            <a:off x="12623527" y="32360635"/>
-            <a:ext cx="10841037" cy="2757862"/>
+            <a:off x="12541672" y="5367087"/>
+            <a:ext cx="10841037" cy="1957643"/>
           </a:xfrm>
           <a:prstGeom prst="rect">
             <a:avLst/>
@@ -12171,28 +11958,624 @@
             </a:lvl9pPr>
           </a:lstStyle>
           <a:p>
-            <a:pPr algn="just"/>
-            <a:r>
-              <a:rPr lang="en-US" sz="2600" dirty="0">
-                <a:latin typeface="+mj-lt"/>
-              </a:rPr>
-              <a:t>We created a complete end-to-end product </a:t>
-            </a:r>
-          </a:p>
-          <a:p>
             <a:pPr marL="457200" indent="-457200" algn="just">
               <a:buFont typeface="Wingdings" pitchFamily="2" charset="2"/>
               <a:buChar char="Ø"/>
             </a:pPr>
             <a:r>
+              <a:rPr lang="en-US" sz="2600" dirty="0" smtClean="0">
+                <a:latin typeface="+mj-lt"/>
+              </a:rPr>
+              <a:t>Designed the PCB of the circuit </a:t>
+            </a:r>
+            <a:r>
+              <a:rPr lang="en-US" sz="2600" dirty="0" smtClean="0">
+                <a:latin typeface="+mj-lt"/>
+              </a:rPr>
+              <a:t>in Eagle and got it manufactured from a PCB prototyping service (PCBway.com)</a:t>
+            </a:r>
+            <a:endParaRPr lang="en-US" sz="2600" dirty="0">
+              <a:latin typeface="+mj-lt"/>
+            </a:endParaRPr>
+          </a:p>
+        </p:txBody>
+      </p:sp>
+      <p:sp>
+        <p:nvSpPr>
+          <p:cNvPr id="32" name="Text Box 472">
+            <a:extLst>
+              <a:ext uri="{FF2B5EF4-FFF2-40B4-BE49-F238E27FC236}">
+                <a16:creationId xmlns="" xmlns:a16="http://schemas.microsoft.com/office/drawing/2014/main" id="{F1A52443-3352-4417-A2E2-ACBDAD15BBAC}"/>
+              </a:ext>
+            </a:extLst>
+          </p:cNvPr>
+          <p:cNvSpPr txBox="1">
+            <a:spLocks noChangeArrowheads="1"/>
+          </p:cNvSpPr>
+          <p:nvPr/>
+        </p:nvSpPr>
+        <p:spPr bwMode="auto">
+          <a:xfrm>
+            <a:off x="12718391" y="11842789"/>
+            <a:ext cx="7319583" cy="1157424"/>
+          </a:xfrm>
+          <a:prstGeom prst="rect">
+            <a:avLst/>
+          </a:prstGeom>
+          <a:solidFill>
+            <a:srgbClr val="FFFFFF"/>
+          </a:solidFill>
+          <a:ln>
+            <a:noFill/>
+          </a:ln>
+          <a:effectLst/>
+        </p:spPr>
+        <p:txBody>
+          <a:bodyPr wrap="square" lIns="374995" tIns="374995" rIns="374995" bIns="374995">
+            <a:spAutoFit/>
+          </a:bodyPr>
+          <a:lstStyle>
+            <a:lvl1pPr defTabSz="3600450">
+              <a:defRPr>
+                <a:solidFill>
+                  <a:schemeClr val="tx1"/>
+                </a:solidFill>
+                <a:latin typeface="Arial" charset="0"/>
+              </a:defRPr>
+            </a:lvl1pPr>
+            <a:lvl2pPr marL="374650" defTabSz="3600450">
+              <a:defRPr>
+                <a:solidFill>
+                  <a:schemeClr val="tx1"/>
+                </a:solidFill>
+                <a:latin typeface="Arial" charset="0"/>
+              </a:defRPr>
+            </a:lvl2pPr>
+            <a:lvl3pPr marL="749300" defTabSz="3600450">
+              <a:defRPr>
+                <a:solidFill>
+                  <a:schemeClr val="tx1"/>
+                </a:solidFill>
+                <a:latin typeface="Arial" charset="0"/>
+              </a:defRPr>
+            </a:lvl3pPr>
+            <a:lvl4pPr marL="1125538" defTabSz="3600450">
+              <a:defRPr>
+                <a:solidFill>
+                  <a:schemeClr val="tx1"/>
+                </a:solidFill>
+                <a:latin typeface="Arial" charset="0"/>
+              </a:defRPr>
+            </a:lvl4pPr>
+            <a:lvl5pPr marL="1500188" defTabSz="3600450">
+              <a:defRPr>
+                <a:solidFill>
+                  <a:schemeClr val="tx1"/>
+                </a:solidFill>
+                <a:latin typeface="Arial" charset="0"/>
+              </a:defRPr>
+            </a:lvl5pPr>
+            <a:lvl6pPr marL="1957388" defTabSz="3600450" fontAlgn="base">
+              <a:spcBef>
+                <a:spcPct val="0"/>
+              </a:spcBef>
+              <a:spcAft>
+                <a:spcPct val="0"/>
+              </a:spcAft>
+              <a:defRPr>
+                <a:solidFill>
+                  <a:schemeClr val="tx1"/>
+                </a:solidFill>
+                <a:latin typeface="Arial" charset="0"/>
+              </a:defRPr>
+            </a:lvl6pPr>
+            <a:lvl7pPr marL="2414588" defTabSz="3600450" fontAlgn="base">
+              <a:spcBef>
+                <a:spcPct val="0"/>
+              </a:spcBef>
+              <a:spcAft>
+                <a:spcPct val="0"/>
+              </a:spcAft>
+              <a:defRPr>
+                <a:solidFill>
+                  <a:schemeClr val="tx1"/>
+                </a:solidFill>
+                <a:latin typeface="Arial" charset="0"/>
+              </a:defRPr>
+            </a:lvl7pPr>
+            <a:lvl8pPr marL="2871788" defTabSz="3600450" fontAlgn="base">
+              <a:spcBef>
+                <a:spcPct val="0"/>
+              </a:spcBef>
+              <a:spcAft>
+                <a:spcPct val="0"/>
+              </a:spcAft>
+              <a:defRPr>
+                <a:solidFill>
+                  <a:schemeClr val="tx1"/>
+                </a:solidFill>
+                <a:latin typeface="Arial" charset="0"/>
+              </a:defRPr>
+            </a:lvl8pPr>
+            <a:lvl9pPr marL="3328988" defTabSz="3600450" fontAlgn="base">
+              <a:spcBef>
+                <a:spcPct val="0"/>
+              </a:spcBef>
+              <a:spcAft>
+                <a:spcPct val="0"/>
+              </a:spcAft>
+              <a:defRPr>
+                <a:solidFill>
+                  <a:schemeClr val="tx1"/>
+                </a:solidFill>
+                <a:latin typeface="Arial" charset="0"/>
+              </a:defRPr>
+            </a:lvl9pPr>
+          </a:lstStyle>
+          <a:p>
+            <a:pPr marL="457200" indent="-457200" algn="just">
+              <a:buFont typeface="Wingdings" panose="05000000000000000000" pitchFamily="2" charset="2"/>
+              <a:buChar char="Ø"/>
+            </a:pPr>
+            <a:r>
               <a:rPr lang="en-US" sz="2600" dirty="0">
                 <a:latin typeface="+mj-lt"/>
               </a:rPr>
-              <a:t>Got the PCBs manufactured for the devices</a:t>
-            </a:r>
-          </a:p>
+              <a:t>We </a:t>
+            </a:r>
+            <a:r>
+              <a:rPr lang="en-US" sz="2600" dirty="0" smtClean="0">
+                <a:latin typeface="+mj-lt"/>
+              </a:rPr>
+              <a:t>assembled the board</a:t>
+            </a:r>
+            <a:endParaRPr lang="en-US" sz="2600" dirty="0">
+              <a:latin typeface="+mj-lt"/>
+            </a:endParaRPr>
+          </a:p>
+        </p:txBody>
+      </p:sp>
+      <p:sp>
+        <p:nvSpPr>
+          <p:cNvPr id="33" name="Text Box 472">
+            <a:extLst>
+              <a:ext uri="{FF2B5EF4-FFF2-40B4-BE49-F238E27FC236}">
+                <a16:creationId xmlns="" xmlns:a16="http://schemas.microsoft.com/office/drawing/2014/main" id="{F1A52443-3352-4417-A2E2-ACBDAD15BBAC}"/>
+              </a:ext>
+            </a:extLst>
+          </p:cNvPr>
+          <p:cNvSpPr txBox="1">
+            <a:spLocks noChangeArrowheads="1"/>
+          </p:cNvSpPr>
+          <p:nvPr/>
+        </p:nvSpPr>
+        <p:spPr bwMode="auto">
+          <a:xfrm>
+            <a:off x="12718391" y="17441036"/>
+            <a:ext cx="10841037" cy="1157424"/>
+          </a:xfrm>
+          <a:prstGeom prst="rect">
+            <a:avLst/>
+          </a:prstGeom>
+          <a:solidFill>
+            <a:srgbClr val="FFFFFF"/>
+          </a:solidFill>
+          <a:ln>
+            <a:noFill/>
+          </a:ln>
+          <a:effectLst/>
+        </p:spPr>
+        <p:txBody>
+          <a:bodyPr wrap="square" lIns="374995" tIns="374995" rIns="374995" bIns="374995">
+            <a:spAutoFit/>
+          </a:bodyPr>
+          <a:lstStyle>
+            <a:lvl1pPr defTabSz="3600450">
+              <a:defRPr>
+                <a:solidFill>
+                  <a:schemeClr val="tx1"/>
+                </a:solidFill>
+                <a:latin typeface="Arial" charset="0"/>
+              </a:defRPr>
+            </a:lvl1pPr>
+            <a:lvl2pPr marL="374650" defTabSz="3600450">
+              <a:defRPr>
+                <a:solidFill>
+                  <a:schemeClr val="tx1"/>
+                </a:solidFill>
+                <a:latin typeface="Arial" charset="0"/>
+              </a:defRPr>
+            </a:lvl2pPr>
+            <a:lvl3pPr marL="749300" defTabSz="3600450">
+              <a:defRPr>
+                <a:solidFill>
+                  <a:schemeClr val="tx1"/>
+                </a:solidFill>
+                <a:latin typeface="Arial" charset="0"/>
+              </a:defRPr>
+            </a:lvl3pPr>
+            <a:lvl4pPr marL="1125538" defTabSz="3600450">
+              <a:defRPr>
+                <a:solidFill>
+                  <a:schemeClr val="tx1"/>
+                </a:solidFill>
+                <a:latin typeface="Arial" charset="0"/>
+              </a:defRPr>
+            </a:lvl4pPr>
+            <a:lvl5pPr marL="1500188" defTabSz="3600450">
+              <a:defRPr>
+                <a:solidFill>
+                  <a:schemeClr val="tx1"/>
+                </a:solidFill>
+                <a:latin typeface="Arial" charset="0"/>
+              </a:defRPr>
+            </a:lvl5pPr>
+            <a:lvl6pPr marL="1957388" defTabSz="3600450" fontAlgn="base">
+              <a:spcBef>
+                <a:spcPct val="0"/>
+              </a:spcBef>
+              <a:spcAft>
+                <a:spcPct val="0"/>
+              </a:spcAft>
+              <a:defRPr>
+                <a:solidFill>
+                  <a:schemeClr val="tx1"/>
+                </a:solidFill>
+                <a:latin typeface="Arial" charset="0"/>
+              </a:defRPr>
+            </a:lvl6pPr>
+            <a:lvl7pPr marL="2414588" defTabSz="3600450" fontAlgn="base">
+              <a:spcBef>
+                <a:spcPct val="0"/>
+              </a:spcBef>
+              <a:spcAft>
+                <a:spcPct val="0"/>
+              </a:spcAft>
+              <a:defRPr>
+                <a:solidFill>
+                  <a:schemeClr val="tx1"/>
+                </a:solidFill>
+                <a:latin typeface="Arial" charset="0"/>
+              </a:defRPr>
+            </a:lvl7pPr>
+            <a:lvl8pPr marL="2871788" defTabSz="3600450" fontAlgn="base">
+              <a:spcBef>
+                <a:spcPct val="0"/>
+              </a:spcBef>
+              <a:spcAft>
+                <a:spcPct val="0"/>
+              </a:spcAft>
+              <a:defRPr>
+                <a:solidFill>
+                  <a:schemeClr val="tx1"/>
+                </a:solidFill>
+                <a:latin typeface="Arial" charset="0"/>
+              </a:defRPr>
+            </a:lvl8pPr>
+            <a:lvl9pPr marL="3328988" defTabSz="3600450" fontAlgn="base">
+              <a:spcBef>
+                <a:spcPct val="0"/>
+              </a:spcBef>
+              <a:spcAft>
+                <a:spcPct val="0"/>
+              </a:spcAft>
+              <a:defRPr>
+                <a:solidFill>
+                  <a:schemeClr val="tx1"/>
+                </a:solidFill>
+                <a:latin typeface="Arial" charset="0"/>
+              </a:defRPr>
+            </a:lvl9pPr>
+          </a:lstStyle>
           <a:p>
             <a:pPr marL="457200" indent="-457200" algn="just">
+              <a:buFont typeface="Wingdings" panose="05000000000000000000" pitchFamily="2" charset="2"/>
+              <a:buChar char="Ø"/>
+            </a:pPr>
+            <a:r>
+              <a:rPr lang="en-US" sz="2600" dirty="0" smtClean="0">
+                <a:latin typeface="+mj-lt"/>
+              </a:rPr>
+              <a:t>We manufactured the housing unit using 3D printing</a:t>
+            </a:r>
+            <a:endParaRPr lang="en-US" sz="2600" dirty="0">
+              <a:latin typeface="+mj-lt"/>
+            </a:endParaRPr>
+          </a:p>
+        </p:txBody>
+      </p:sp>
+      <p:pic>
+        <p:nvPicPr>
+          <p:cNvPr id="7" name="Picture 6"/>
+          <p:cNvPicPr>
+            <a:picLocks noChangeAspect="1"/>
+          </p:cNvPicPr>
+          <p:nvPr/>
+        </p:nvPicPr>
+        <p:blipFill>
+          <a:blip r:embed="rId6">
+            <a:extLst>
+              <a:ext uri="{28A0092B-C50C-407E-A947-70E740481C1C}">
+                <a14:useLocalDpi xmlns:a14="http://schemas.microsoft.com/office/drawing/2010/main" val="0"/>
+              </a:ext>
+            </a:extLst>
+          </a:blip>
+          <a:stretch>
+            <a:fillRect/>
+          </a:stretch>
+        </p:blipFill>
+        <p:spPr>
+          <a:xfrm>
+            <a:off x="13081524" y="30650652"/>
+            <a:ext cx="10114770" cy="4103857"/>
+          </a:xfrm>
+          <a:prstGeom prst="rect">
+            <a:avLst/>
+          </a:prstGeom>
+        </p:spPr>
+      </p:pic>
+      <p:pic>
+        <p:nvPicPr>
+          <p:cNvPr id="8" name="Picture 7"/>
+          <p:cNvPicPr>
+            <a:picLocks noChangeAspect="1"/>
+          </p:cNvPicPr>
+          <p:nvPr/>
+        </p:nvPicPr>
+        <p:blipFill>
+          <a:blip r:embed="rId7" cstate="print">
+            <a:extLst>
+              <a:ext uri="{28A0092B-C50C-407E-A947-70E740481C1C}">
+                <a14:useLocalDpi xmlns:a14="http://schemas.microsoft.com/office/drawing/2010/main" val="0"/>
+              </a:ext>
+            </a:extLst>
+          </a:blip>
+          <a:stretch>
+            <a:fillRect/>
+          </a:stretch>
+        </p:blipFill>
+        <p:spPr>
+          <a:xfrm>
+            <a:off x="14709097" y="24116923"/>
+            <a:ext cx="6175998" cy="4631127"/>
+          </a:xfrm>
+          <a:prstGeom prst="rect">
+            <a:avLst/>
+          </a:prstGeom>
+        </p:spPr>
+      </p:pic>
+      <p:pic>
+        <p:nvPicPr>
+          <p:cNvPr id="10" name="Picture 9"/>
+          <p:cNvPicPr>
+            <a:picLocks noChangeAspect="1"/>
+          </p:cNvPicPr>
+          <p:nvPr/>
+        </p:nvPicPr>
+        <p:blipFill>
+          <a:blip r:embed="rId8" cstate="print">
+            <a:extLst>
+              <a:ext uri="{28A0092B-C50C-407E-A947-70E740481C1C}">
+                <a14:useLocalDpi xmlns:a14="http://schemas.microsoft.com/office/drawing/2010/main" val="0"/>
+              </a:ext>
+            </a:extLst>
+          </a:blip>
+          <a:stretch>
+            <a:fillRect/>
+          </a:stretch>
+        </p:blipFill>
+        <p:spPr>
+          <a:xfrm>
+            <a:off x="26573264" y="10805048"/>
+            <a:ext cx="6206602" cy="4655933"/>
+          </a:xfrm>
+          <a:prstGeom prst="rect">
+            <a:avLst/>
+          </a:prstGeom>
+        </p:spPr>
+      </p:pic>
+      <p:pic>
+        <p:nvPicPr>
+          <p:cNvPr id="12" name="Picture 11"/>
+          <p:cNvPicPr>
+            <a:picLocks noChangeAspect="1"/>
+          </p:cNvPicPr>
+          <p:nvPr/>
+        </p:nvPicPr>
+        <p:blipFill>
+          <a:blip r:embed="rId9" cstate="print">
+            <a:extLst>
+              <a:ext uri="{28A0092B-C50C-407E-A947-70E740481C1C}">
+                <a14:useLocalDpi xmlns:a14="http://schemas.microsoft.com/office/drawing/2010/main" val="0"/>
+              </a:ext>
+            </a:extLst>
+          </a:blip>
+          <a:stretch>
+            <a:fillRect/>
+          </a:stretch>
+        </p:blipFill>
+        <p:spPr>
+          <a:xfrm>
+            <a:off x="12718391" y="18751091"/>
+            <a:ext cx="5019143" cy="3762949"/>
+          </a:xfrm>
+          <a:prstGeom prst="rect">
+            <a:avLst/>
+          </a:prstGeom>
+        </p:spPr>
+      </p:pic>
+      <p:pic>
+        <p:nvPicPr>
+          <p:cNvPr id="13" name="Picture 12"/>
+          <p:cNvPicPr>
+            <a:picLocks noChangeAspect="1"/>
+          </p:cNvPicPr>
+          <p:nvPr/>
+        </p:nvPicPr>
+        <p:blipFill>
+          <a:blip r:embed="rId10" cstate="print">
+            <a:extLst>
+              <a:ext uri="{28A0092B-C50C-407E-A947-70E740481C1C}">
+                <a14:useLocalDpi xmlns:a14="http://schemas.microsoft.com/office/drawing/2010/main" val="0"/>
+              </a:ext>
+            </a:extLst>
+          </a:blip>
+          <a:stretch>
+            <a:fillRect/>
+          </a:stretch>
+        </p:blipFill>
+        <p:spPr>
+          <a:xfrm>
+            <a:off x="17820111" y="18751091"/>
+            <a:ext cx="5015909" cy="3762949"/>
+          </a:xfrm>
+          <a:prstGeom prst="rect">
+            <a:avLst/>
+          </a:prstGeom>
+        </p:spPr>
+      </p:pic>
+      <p:pic>
+        <p:nvPicPr>
+          <p:cNvPr id="14" name="Picture 13"/>
+          <p:cNvPicPr>
+            <a:picLocks noChangeAspect="1"/>
+          </p:cNvPicPr>
+          <p:nvPr/>
+        </p:nvPicPr>
+        <p:blipFill>
+          <a:blip r:embed="rId11">
+            <a:extLst>
+              <a:ext uri="{28A0092B-C50C-407E-A947-70E740481C1C}">
+                <a14:useLocalDpi xmlns:a14="http://schemas.microsoft.com/office/drawing/2010/main" val="0"/>
+              </a:ext>
+            </a:extLst>
+          </a:blip>
+          <a:stretch>
+            <a:fillRect/>
+          </a:stretch>
+        </p:blipFill>
+        <p:spPr>
+          <a:xfrm>
+            <a:off x="25521366" y="20415177"/>
+            <a:ext cx="8158002" cy="3360927"/>
+          </a:xfrm>
+          <a:prstGeom prst="rect">
+            <a:avLst/>
+          </a:prstGeom>
+        </p:spPr>
+      </p:pic>
+      <p:pic>
+        <p:nvPicPr>
+          <p:cNvPr id="15" name="Picture 14"/>
+          <p:cNvPicPr>
+            <a:picLocks noChangeAspect="1"/>
+          </p:cNvPicPr>
+          <p:nvPr/>
+        </p:nvPicPr>
+        <p:blipFill>
+          <a:blip r:embed="rId6">
+            <a:extLst>
+              <a:ext uri="{28A0092B-C50C-407E-A947-70E740481C1C}">
+                <a14:useLocalDpi xmlns:a14="http://schemas.microsoft.com/office/drawing/2010/main" val="0"/>
+              </a:ext>
+            </a:extLst>
+          </a:blip>
+          <a:stretch>
+            <a:fillRect/>
+          </a:stretch>
+        </p:blipFill>
+        <p:spPr>
+          <a:xfrm>
+            <a:off x="25521365" y="17059134"/>
+            <a:ext cx="8158002" cy="3309939"/>
+          </a:xfrm>
+          <a:prstGeom prst="rect">
+            <a:avLst/>
+          </a:prstGeom>
+        </p:spPr>
+      </p:pic>
+      <p:pic>
+        <p:nvPicPr>
+          <p:cNvPr id="16" name="Picture 15"/>
+          <p:cNvPicPr>
+            <a:picLocks noChangeAspect="1"/>
+          </p:cNvPicPr>
+          <p:nvPr/>
+        </p:nvPicPr>
+        <p:blipFill>
+          <a:blip r:embed="rId12">
+            <a:extLst>
+              <a:ext uri="{28A0092B-C50C-407E-A947-70E740481C1C}">
+                <a14:useLocalDpi xmlns:a14="http://schemas.microsoft.com/office/drawing/2010/main" val="0"/>
+              </a:ext>
+            </a:extLst>
+          </a:blip>
+          <a:stretch>
+            <a:fillRect/>
+          </a:stretch>
+        </p:blipFill>
+        <p:spPr>
+          <a:xfrm>
+            <a:off x="13183762" y="7320099"/>
+            <a:ext cx="4448482" cy="4297597"/>
+          </a:xfrm>
+          <a:prstGeom prst="rect">
+            <a:avLst/>
+          </a:prstGeom>
+        </p:spPr>
+      </p:pic>
+      <p:pic>
+        <p:nvPicPr>
+          <p:cNvPr id="18" name="Picture 17"/>
+          <p:cNvPicPr>
+            <a:picLocks noChangeAspect="1"/>
+          </p:cNvPicPr>
+          <p:nvPr/>
+        </p:nvPicPr>
+        <p:blipFill>
+          <a:blip r:embed="rId13" cstate="print">
+            <a:extLst>
+              <a:ext uri="{28A0092B-C50C-407E-A947-70E740481C1C}">
+                <a14:useLocalDpi xmlns:a14="http://schemas.microsoft.com/office/drawing/2010/main" val="0"/>
+              </a:ext>
+            </a:extLst>
+          </a:blip>
+          <a:stretch>
+            <a:fillRect/>
+          </a:stretch>
+        </p:blipFill>
+        <p:spPr>
+          <a:xfrm>
+            <a:off x="18052497" y="7342603"/>
+            <a:ext cx="4438013" cy="4275093"/>
+          </a:xfrm>
+          <a:prstGeom prst="rect">
+            <a:avLst/>
+          </a:prstGeom>
+        </p:spPr>
+      </p:pic>
+      <p:sp>
+        <p:nvSpPr>
+          <p:cNvPr id="21" name="Rectangle 20"/>
+          <p:cNvSpPr/>
+          <p:nvPr/>
+        </p:nvSpPr>
+        <p:spPr>
+          <a:xfrm>
+            <a:off x="24241349" y="9962529"/>
+            <a:ext cx="3645485" cy="492443"/>
+          </a:xfrm>
+          <a:prstGeom prst="rect">
+            <a:avLst/>
+          </a:prstGeom>
+        </p:spPr>
+        <p:txBody>
+          <a:bodyPr wrap="none">
+            <a:spAutoFit/>
+          </a:bodyPr>
+          <a:lstStyle/>
+          <a:p>
+            <a:pPr marL="457200" indent="-457200" algn="just" defTabSz="3600450">
               <a:buFont typeface="Wingdings" pitchFamily="2" charset="2"/>
               <a:buChar char="Ø"/>
             </a:pPr>
@@ -12200,32 +12583,150 @@
               <a:rPr lang="en-US" sz="2600" dirty="0">
                 <a:latin typeface="+mj-lt"/>
               </a:rPr>
-              <a:t>3D printed the product box</a:t>
-            </a:r>
-          </a:p>
-          <a:p>
-            <a:pPr marL="457200" indent="-457200" algn="just">
-              <a:buFont typeface="Wingdings" pitchFamily="2" charset="2"/>
+              <a:t>The end product</a:t>
+            </a:r>
+            <a:endParaRPr lang="en-US" sz="2600" dirty="0">
+              <a:latin typeface="+mj-lt"/>
+            </a:endParaRPr>
+          </a:p>
+        </p:txBody>
+      </p:sp>
+      <p:sp>
+        <p:nvSpPr>
+          <p:cNvPr id="22" name="Rectangle 21"/>
+          <p:cNvSpPr/>
+          <p:nvPr/>
+        </p:nvSpPr>
+        <p:spPr>
+          <a:xfrm>
+            <a:off x="24093518" y="16411335"/>
+            <a:ext cx="11247823" cy="492443"/>
+          </a:xfrm>
+          <a:prstGeom prst="rect">
+            <a:avLst/>
+          </a:prstGeom>
+        </p:spPr>
+        <p:txBody>
+          <a:bodyPr wrap="none">
+            <a:spAutoFit/>
+          </a:bodyPr>
+          <a:lstStyle/>
+          <a:p>
+            <a:pPr marL="342900" indent="-342900" algn="ctr">
+              <a:buFont typeface="Wingdings" panose="05000000000000000000" pitchFamily="2" charset="2"/>
               <a:buChar char="Ø"/>
             </a:pPr>
             <a:r>
               <a:rPr lang="en-US" sz="2600" dirty="0">
                 <a:latin typeface="+mj-lt"/>
               </a:rPr>
-              <a:t>Designed the web interface</a:t>
-            </a:r>
-          </a:p>
+              <a:t>Web interface showing the occupancy status of each room</a:t>
+            </a:r>
+            <a:endParaRPr lang="en-US" sz="2600" dirty="0">
+              <a:latin typeface="+mj-lt"/>
+            </a:endParaRPr>
+          </a:p>
+        </p:txBody>
+      </p:sp>
+      <p:pic>
+        <p:nvPicPr>
+          <p:cNvPr id="23" name="Picture 22"/>
+          <p:cNvPicPr>
+            <a:picLocks noChangeAspect="1"/>
+          </p:cNvPicPr>
+          <p:nvPr/>
+        </p:nvPicPr>
+        <p:blipFill>
+          <a:blip r:embed="rId14" cstate="print">
+            <a:extLst>
+              <a:ext uri="{28A0092B-C50C-407E-A947-70E740481C1C}">
+                <a14:useLocalDpi xmlns:a14="http://schemas.microsoft.com/office/drawing/2010/main" val="0"/>
+              </a:ext>
+            </a:extLst>
+          </a:blip>
+          <a:stretch>
+            <a:fillRect/>
+          </a:stretch>
+        </p:blipFill>
+        <p:spPr>
+          <a:xfrm>
+            <a:off x="947051" y="28709391"/>
+            <a:ext cx="10746877" cy="6045118"/>
+          </a:xfrm>
+          <a:prstGeom prst="rect">
+            <a:avLst/>
+          </a:prstGeom>
+        </p:spPr>
+      </p:pic>
+      <p:sp>
+        <p:nvSpPr>
+          <p:cNvPr id="26" name="Rectangle 25"/>
+          <p:cNvSpPr/>
+          <p:nvPr/>
+        </p:nvSpPr>
+        <p:spPr>
+          <a:xfrm>
+            <a:off x="12833493" y="29640868"/>
+            <a:ext cx="9889347" cy="892552"/>
+          </a:xfrm>
+          <a:prstGeom prst="rect">
+            <a:avLst/>
+          </a:prstGeom>
+        </p:spPr>
+        <p:txBody>
+          <a:bodyPr wrap="square">
+            <a:spAutoFit/>
+          </a:bodyPr>
+          <a:lstStyle/>
           <a:p>
             <a:pPr marL="457200" indent="-457200" algn="just">
-              <a:buFont typeface="Wingdings" pitchFamily="2" charset="2"/>
+              <a:buFont typeface="Wingdings" panose="05000000000000000000" pitchFamily="2" charset="2"/>
               <a:buChar char="Ø"/>
             </a:pPr>
             <a:r>
-              <a:rPr lang="en-US" sz="2600" dirty="0">
+              <a:rPr lang="en-US" sz="2600" dirty="0" smtClean="0">
                 <a:latin typeface="+mj-lt"/>
               </a:rPr>
-              <a:t>Created a real time wi-fi mesh</a:t>
-            </a:r>
+              <a:t>Designed a web interface to show the occupancy status of each room</a:t>
+            </a:r>
+            <a:endParaRPr lang="en-US" sz="2600" dirty="0">
+              <a:latin typeface="+mj-lt"/>
+            </a:endParaRPr>
+          </a:p>
+        </p:txBody>
+      </p:sp>
+      <p:sp>
+        <p:nvSpPr>
+          <p:cNvPr id="27" name="Rectangle 26"/>
+          <p:cNvSpPr/>
+          <p:nvPr/>
+        </p:nvSpPr>
+        <p:spPr>
+          <a:xfrm>
+            <a:off x="13478590" y="23069260"/>
+            <a:ext cx="7620099" cy="492443"/>
+          </a:xfrm>
+          <a:prstGeom prst="rect">
+            <a:avLst/>
+          </a:prstGeom>
+        </p:spPr>
+        <p:txBody>
+          <a:bodyPr wrap="none">
+            <a:spAutoFit/>
+          </a:bodyPr>
+          <a:lstStyle/>
+          <a:p>
+            <a:pPr marL="457200" indent="-457200">
+              <a:buFont typeface="Wingdings" panose="05000000000000000000" pitchFamily="2" charset="2"/>
+              <a:buChar char="Ø"/>
+            </a:pPr>
+            <a:r>
+              <a:rPr lang="en-US" sz="2600" dirty="0" smtClean="0">
+                <a:latin typeface="+mj-lt"/>
+              </a:rPr>
+              <a:t>Inside the housing of the final product</a:t>
+            </a:r>
+            <a:endParaRPr lang="en-IN" dirty="0"/>
           </a:p>
         </p:txBody>
       </p:sp>

</xml_diff>